<commit_message>
Poster, reference fixed and changed application.conf to prevent db timeouts
</commit_message>
<xml_diff>
--- a/deliverables/poster/poster.pptx
+++ b/deliverables/poster/poster.pptx
@@ -1415,7 +1415,7 @@
             <a:r>
               <a:rPr lang="en-US" sz="5810">
                 <a:solidFill>
-                  <a:srgbClr val="00ccff"/>
+                  <a:srgbClr val="3399ff"/>
                 </a:solidFill>
                 <a:latin typeface="Arial"/>
               </a:rPr>
@@ -1439,7 +1439,9 @@
           <a:prstGeom prst="rect">
             <a:avLst/>
           </a:prstGeom>
-          <a:noFill/>
+          <a:solidFill>
+            <a:srgbClr val="ffffff"/>
+          </a:solidFill>
           <a:ln>
             <a:noFill/>
           </a:ln>
@@ -1450,11 +1452,11 @@
             <a:r>
               <a:rPr b="1" lang="en-US" sz="2800">
                 <a:solidFill>
-                  <a:srgbClr val="00ccff"/>
+                  <a:srgbClr val="000000"/>
                 </a:solidFill>
                 <a:latin typeface="Arial"/>
               </a:rPr>
-              <a:t>The Problem</a:t>
+              <a:t>The problem</a:t>
             </a:r>
             <a:endParaRPr/>
           </a:p>
@@ -1537,13 +1539,15 @@
         </p:nvSpPr>
         <p:spPr>
           <a:xfrm>
-            <a:off x="1088280" y="1256760"/>
-            <a:ext cx="12969360" cy="456840"/>
-          </a:xfrm>
-          <a:prstGeom prst="rect">
-            <a:avLst/>
-          </a:prstGeom>
-          <a:noFill/>
+            <a:off x="2286000" y="1256760"/>
+            <a:ext cx="10515600" cy="456840"/>
+          </a:xfrm>
+          <a:prstGeom prst="rect">
+            <a:avLst/>
+          </a:prstGeom>
+          <a:solidFill>
+            <a:srgbClr val="ffffff"/>
+          </a:solidFill>
           <a:ln>
             <a:noFill/>
           </a:ln>
@@ -1574,24 +1578,26 @@
         </p:nvSpPr>
         <p:spPr>
           <a:xfrm>
-            <a:off x="7864200" y="4480200"/>
+            <a:off x="7864200" y="4438080"/>
             <a:ext cx="6766200" cy="3200040"/>
           </a:xfrm>
           <a:prstGeom prst="rect">
             <a:avLst/>
           </a:prstGeom>
-          <a:noFill/>
-          <a:ln>
+          <a:solidFill>
+            <a:srgbClr val="ffffff"/>
+          </a:solidFill>
+          <a:ln w="12600">
             <a:noFill/>
           </a:ln>
         </p:spPr>
         <p:txBody>
-          <a:bodyPr lIns="0" rIns="0" tIns="0" bIns="0" anchor="ctr"/>
+          <a:bodyPr lIns="-12600" rIns="-12600" tIns="-12600" bIns="-12600" anchor="ctr"/>
           <a:p>
             <a:r>
               <a:rPr b="1" lang="en-US" sz="2800">
                 <a:solidFill>
-                  <a:srgbClr val="00ccff"/>
+                  <a:srgbClr val="000000"/>
                 </a:solidFill>
                 <a:latin typeface="Arial"/>
               </a:rPr>
@@ -1699,7 +1705,9 @@
           <a:prstGeom prst="rect">
             <a:avLst/>
           </a:prstGeom>
-          <a:noFill/>
+          <a:solidFill>
+            <a:srgbClr val="ffffff"/>
+          </a:solidFill>
           <a:ln>
             <a:noFill/>
           </a:ln>
@@ -1710,7 +1718,7 @@
             <a:r>
               <a:rPr b="1" lang="en-US" sz="2800">
                 <a:solidFill>
-                  <a:srgbClr val="00ccff"/>
+                  <a:srgbClr val="000000"/>
                 </a:solidFill>
                 <a:latin typeface="Arial"/>
               </a:rPr>
@@ -1762,13 +1770,15 @@
         </p:nvSpPr>
         <p:spPr>
           <a:xfrm>
-            <a:off x="548280" y="10149840"/>
-            <a:ext cx="14173560" cy="457200"/>
-          </a:xfrm>
-          <a:prstGeom prst="rect">
-            <a:avLst/>
-          </a:prstGeom>
-          <a:noFill/>
+            <a:off x="3108960" y="10149840"/>
+            <a:ext cx="8686800" cy="457200"/>
+          </a:xfrm>
+          <a:prstGeom prst="rect">
+            <a:avLst/>
+          </a:prstGeom>
+          <a:solidFill>
+            <a:srgbClr val="ffffff"/>
+          </a:solidFill>
           <a:ln>
             <a:noFill/>
           </a:ln>
@@ -1798,15 +1808,15 @@
         </p:nvPicPr>
         <p:blipFill>
           <a:blip r:embed="rId2"/>
-          <a:srcRect l="440380" t="0" r="0" b="0"/>
+          <a:srcRect l="382840" t="0" r="927652" b="1196359"/>
           <a:stretch>
             <a:fillRect/>
           </a:stretch>
         </p:blipFill>
         <p:spPr>
           <a:xfrm>
-            <a:off x="731880" y="4388760"/>
-            <a:ext cx="5851800" cy="3657240"/>
+            <a:off x="8869680" y="7680240"/>
+            <a:ext cx="3758040" cy="2386080"/>
           </a:xfrm>
           <a:prstGeom prst="rect">
             <a:avLst/>
@@ -1824,15 +1834,14 @@
         </p:nvPicPr>
         <p:blipFill>
           <a:blip r:embed="rId3"/>
-          <a:srcRect l="382840" t="0" r="927652" b="1196359"/>
           <a:stretch>
             <a:fillRect/>
           </a:stretch>
         </p:blipFill>
         <p:spPr>
           <a:xfrm>
-            <a:off x="8869680" y="7771680"/>
-            <a:ext cx="3758040" cy="2386080"/>
+            <a:off x="640080" y="4389120"/>
+            <a:ext cx="6492240" cy="3474720"/>
           </a:xfrm>
           <a:prstGeom prst="rect">
             <a:avLst/>

</xml_diff>